<commit_message>
Add slides and update gitignore
</commit_message>
<xml_diff>
--- a/chep2016-lhcbpr-posterA0-v2.pptx
+++ b/chep2016-lhcbpr-posterA0-v2.pptx
@@ -4318,7 +4318,7 @@
         </p:nvSpPr>
         <p:spPr bwMode="auto">
           <a:xfrm>
-            <a:off x="0" y="0"/>
+            <a:off x="0" y="18509"/>
             <a:ext cx="30784800" cy="3314700"/>
           </a:xfrm>
           <a:prstGeom prst="rect">
@@ -4431,7 +4431,7 @@
         </p:nvSpPr>
         <p:spPr bwMode="auto">
           <a:xfrm>
-            <a:off x="0" y="3319780"/>
+            <a:off x="0" y="3341942"/>
             <a:ext cx="30861000" cy="2489200"/>
           </a:xfrm>
           <a:prstGeom prst="rect">
@@ -4690,7 +4690,7 @@
         <p:spPr>
           <a:xfrm>
             <a:off x="1030288" y="7781878"/>
-            <a:ext cx="8991600" cy="13449836"/>
+            <a:ext cx="8991599" cy="13449836"/>
           </a:xfrm>
           <a:prstGeom prst="rect">
             <a:avLst/>
@@ -6355,7 +6355,7 @@
         <p:spPr bwMode="auto">
           <a:xfrm>
             <a:off x="19391309" y="35545637"/>
-            <a:ext cx="10493696" cy="7469263"/>
+            <a:ext cx="10493696" cy="7926463"/>
           </a:xfrm>
           <a:prstGeom prst="rect">
             <a:avLst/>
@@ -6397,10 +6397,16 @@
               <a:tabLst/>
             </a:pPr>
             <a:r>
-              <a:rPr lang="en-US" sz="2800" dirty="0" smtClean="0">
-                <a:latin typeface="+mn-lt"/>
-              </a:rPr>
-              <a:t>LHCbPR not coupled to the LHCb software stack and can be adapted for other experiments and projects</a:t>
+              <a:rPr lang="en-US" sz="2600" dirty="0" smtClean="0">
+                <a:latin typeface="+mn-lt"/>
+              </a:rPr>
+              <a:t>LHCbPR </a:t>
+            </a:r>
+            <a:r>
+              <a:rPr lang="en-US" sz="2600" dirty="0" smtClean="0">
+                <a:latin typeface="+mn-lt"/>
+              </a:rPr>
+              <a:t>not coupled to the LHCb software stack and can be adapted for other experiments and projects</a:t>
             </a:r>
           </a:p>
           <a:p>
@@ -6421,7 +6427,7 @@
               <a:tabLst/>
             </a:pPr>
             <a:r>
-              <a:rPr kumimoji="0" lang="en-US" sz="2800" b="0" i="0" u="none" strike="noStrike" cap="none" normalizeH="0" baseline="0" dirty="0" smtClean="0">
+              <a:rPr kumimoji="0" lang="en-US" sz="2600" b="0" i="0" u="none" strike="noStrike" cap="none" normalizeH="0" baseline="0" dirty="0" smtClean="0">
                 <a:ln>
                   <a:noFill/>
                 </a:ln>
@@ -6434,7 +6440,7 @@
               <a:t>We</a:t>
             </a:r>
             <a:r>
-              <a:rPr kumimoji="0" lang="en-US" sz="2800" b="0" i="0" u="none" strike="noStrike" cap="none" normalizeH="0" dirty="0" smtClean="0">
+              <a:rPr kumimoji="0" lang="en-US" sz="2600" b="0" i="0" u="none" strike="noStrike" cap="none" normalizeH="0" dirty="0" smtClean="0">
                 <a:ln>
                   <a:noFill/>
                 </a:ln>
@@ -6465,12 +6471,12 @@
               <a:tabLst/>
             </a:pPr>
             <a:r>
-              <a:rPr lang="en-US" sz="2800" dirty="0" smtClean="0">
+              <a:rPr lang="en-US" sz="2600" dirty="0" smtClean="0">
                 <a:latin typeface="+mn-lt"/>
               </a:rPr>
               <a:t>Easy to develop new clients for API service.</a:t>
             </a:r>
-            <a:endParaRPr lang="ru-RU" sz="2800" dirty="0">
+            <a:endParaRPr lang="ru-RU" sz="2600" dirty="0">
               <a:latin typeface="+mn-lt"/>
             </a:endParaRPr>
           </a:p>
@@ -6504,14 +6510,14 @@
                 <a:spcPct val="0"/>
               </a:spcBef>
               <a:spcAft>
-                <a:spcPct val="0"/>
+                <a:spcPts val="1200"/>
               </a:spcAft>
               <a:buClrTx/>
               <a:buSzTx/>
               <a:tabLst/>
             </a:pPr>
             <a:r>
-              <a:rPr kumimoji="0" lang="en-US" sz="2800" b="1" i="0" u="none" strike="noStrike" cap="none" normalizeH="0" dirty="0" smtClean="0">
+              <a:rPr kumimoji="0" lang="en-US" b="1" i="0" u="none" strike="noStrike" cap="none" normalizeH="0" dirty="0" smtClean="0">
                 <a:ln>
                   <a:noFill/>
                 </a:ln>
@@ -6523,22 +6529,6 @@
               </a:rPr>
               <a:t>Resources</a:t>
             </a:r>
-          </a:p>
-          <a:p>
-            <a:pPr marR="0" algn="l" defTabSz="914400" rtl="0" eaLnBrk="0" fontAlgn="base" latinLnBrk="0" hangingPunct="0">
-              <a:lnSpc>
-                <a:spcPct val="100000"/>
-              </a:lnSpc>
-              <a:spcBef>
-                <a:spcPct val="0"/>
-              </a:spcBef>
-              <a:spcAft>
-                <a:spcPct val="0"/>
-              </a:spcAft>
-              <a:buClrTx/>
-              <a:buSzTx/>
-              <a:tabLst/>
-            </a:pPr>
             <a:endParaRPr kumimoji="0" lang="en-US" sz="2800" b="0" i="0" u="none" strike="noStrike" cap="none" normalizeH="0" dirty="0" smtClean="0">
               <a:ln>
                 <a:noFill/>
@@ -6551,242 +6541,389 @@
             </a:endParaRPr>
           </a:p>
           <a:p>
-            <a:pPr marL="900000" indent="-457200" eaLnBrk="0" hangingPunct="0">
+            <a:pPr marL="900000" indent="-342000" eaLnBrk="0" hangingPunct="0">
               <a:buFont typeface="Arial" charset="0"/>
               <a:buChar char="•"/>
             </a:pPr>
             <a:r>
-              <a:rPr lang="en-US" sz="2800" b="1" dirty="0" smtClean="0">
-                <a:latin typeface="+mn-lt"/>
-              </a:rPr>
-              <a:t>API service</a:t>
-            </a:r>
-            <a:r>
-              <a:rPr lang="en-US" sz="2800" dirty="0" smtClean="0">
-                <a:latin typeface="+mn-lt"/>
-              </a:rPr>
-              <a:t>: https</a:t>
-            </a:r>
-            <a:r>
-              <a:rPr lang="en-US" sz="2800" dirty="0">
-                <a:latin typeface="+mn-lt"/>
-              </a:rPr>
-              <a:t>://</a:t>
-            </a:r>
-            <a:r>
-              <a:rPr lang="en-US" sz="2800" dirty="0" err="1" smtClean="0">
-                <a:latin typeface="+mn-lt"/>
-              </a:rPr>
-              <a:t>gitlab.cern.ch</a:t>
-            </a:r>
-            <a:r>
-              <a:rPr lang="en-US" sz="2800" dirty="0" smtClean="0">
-                <a:latin typeface="+mn-lt"/>
-              </a:rPr>
-              <a:t>/</a:t>
-            </a:r>
-            <a:r>
-              <a:rPr lang="en-US" sz="2800" dirty="0" err="1" smtClean="0">
-                <a:latin typeface="+mn-lt"/>
-              </a:rPr>
-              <a:t>lhcb</a:t>
-            </a:r>
-            <a:r>
-              <a:rPr lang="en-US" sz="2800" dirty="0" smtClean="0">
-                <a:latin typeface="+mn-lt"/>
-              </a:rPr>
-              <a:t>-core/LHCbPR2BE</a:t>
-            </a:r>
-          </a:p>
-          <a:p>
-            <a:pPr marL="900000" indent="-457200" eaLnBrk="0" hangingPunct="0">
+              <a:rPr lang="en-US" b="1" dirty="0">
+                <a:latin typeface="+mn-lt"/>
+              </a:rPr>
+              <a:t>Web application</a:t>
+            </a:r>
+            <a:r>
+              <a:rPr lang="en-US" dirty="0">
+                <a:latin typeface="+mn-lt"/>
+              </a:rPr>
+              <a:t>: </a:t>
+            </a:r>
+          </a:p>
+          <a:p>
+            <a:pPr marL="1357200" lvl="1" indent="-342000" eaLnBrk="0" hangingPunct="0">
               <a:buFont typeface="Arial" charset="0"/>
               <a:buChar char="•"/>
             </a:pPr>
             <a:r>
-              <a:rPr lang="en-US" sz="2800" b="1" dirty="0" smtClean="0">
-                <a:latin typeface="+mn-lt"/>
-              </a:rPr>
-              <a:t>ROOT </a:t>
-            </a:r>
-            <a:r>
-              <a:rPr lang="en-US" sz="2800" b="1" dirty="0">
-                <a:latin typeface="+mn-lt"/>
-              </a:rPr>
-              <a:t>HTTP service</a:t>
-            </a:r>
-            <a:r>
-              <a:rPr lang="en-US" sz="2800" dirty="0">
-                <a:latin typeface="+mn-lt"/>
-              </a:rPr>
-              <a:t>: https://</a:t>
-            </a:r>
-            <a:r>
-              <a:rPr lang="en-US" sz="2800" dirty="0" err="1">
-                <a:latin typeface="+mn-lt"/>
-              </a:rPr>
-              <a:t>gitlab.cern.ch</a:t>
-            </a:r>
-            <a:r>
-              <a:rPr lang="en-US" sz="2800" dirty="0">
-                <a:latin typeface="+mn-lt"/>
-              </a:rPr>
-              <a:t>/</a:t>
-            </a:r>
-            <a:r>
-              <a:rPr lang="en-US" sz="2800" dirty="0" err="1">
-                <a:latin typeface="+mn-lt"/>
-              </a:rPr>
-              <a:t>lhcb</a:t>
-            </a:r>
-            <a:r>
-              <a:rPr lang="en-US" sz="2800" dirty="0">
-                <a:latin typeface="+mn-lt"/>
-              </a:rPr>
-              <a:t>-core/LHCbPR2ROOT</a:t>
-            </a:r>
-            <a:endParaRPr lang="en-US" sz="2800" dirty="0" smtClean="0">
+              <a:rPr lang="en-US" dirty="0">
+                <a:latin typeface="+mn-lt"/>
+              </a:rPr>
+              <a:t>https://</a:t>
+            </a:r>
+            <a:r>
+              <a:rPr lang="en-US" dirty="0" smtClean="0">
+                <a:latin typeface="+mn-lt"/>
+              </a:rPr>
+              <a:t>lblhcbpr2.cern.ch (available from CERN network)</a:t>
+            </a:r>
+            <a:endParaRPr lang="en-US" dirty="0">
               <a:latin typeface="+mn-lt"/>
             </a:endParaRPr>
           </a:p>
           <a:p>
-            <a:pPr marL="900000" indent="-457200" eaLnBrk="0" hangingPunct="0">
+            <a:pPr marL="1357200" lvl="1" indent="-342000" eaLnBrk="0" hangingPunct="0">
               <a:buFont typeface="Arial" charset="0"/>
               <a:buChar char="•"/>
             </a:pPr>
             <a:r>
-              <a:rPr lang="en-US" sz="2800" b="1" dirty="0">
-                <a:latin typeface="+mn-lt"/>
-              </a:rPr>
-              <a:t>Web application</a:t>
-            </a:r>
-            <a:r>
-              <a:rPr lang="en-US" sz="2800" dirty="0">
-                <a:latin typeface="+mn-lt"/>
-              </a:rPr>
-              <a:t>: https://</a:t>
-            </a:r>
-            <a:r>
-              <a:rPr lang="en-US" sz="2800" dirty="0" err="1" smtClean="0">
-                <a:latin typeface="+mn-lt"/>
-              </a:rPr>
-              <a:t>gitlab.cern.ch</a:t>
-            </a:r>
-            <a:r>
-              <a:rPr lang="en-US" sz="2800" dirty="0" smtClean="0">
+              <a:rPr lang="en-US" dirty="0">
+                <a:latin typeface="+mn-lt"/>
+              </a:rPr>
+              <a:t>https://</a:t>
+            </a:r>
+            <a:r>
+              <a:rPr lang="en-US" dirty="0" smtClean="0">
+                <a:latin typeface="+mn-lt"/>
+              </a:rPr>
+              <a:t>lblhcbpr2.cern.ch/</a:t>
+            </a:r>
+            <a:r>
+              <a:rPr lang="en-US" dirty="0" err="1" smtClean="0">
+                <a:latin typeface="+mn-lt"/>
+              </a:rPr>
+              <a:t>api</a:t>
+            </a:r>
+            <a:r>
+              <a:rPr lang="en-US" dirty="0" smtClean="0">
                 <a:latin typeface="+mn-lt"/>
               </a:rPr>
               <a:t>/</a:t>
             </a:r>
-            <a:r>
-              <a:rPr lang="en-US" sz="2800" dirty="0" err="1" smtClean="0">
-                <a:latin typeface="+mn-lt"/>
-              </a:rPr>
-              <a:t>lhcb</a:t>
-            </a:r>
-            <a:r>
-              <a:rPr lang="en-US" sz="2800" dirty="0" smtClean="0">
-                <a:latin typeface="+mn-lt"/>
-              </a:rPr>
-              <a:t>-core/LHCbPR2FE</a:t>
-            </a:r>
-          </a:p>
-          <a:p>
-            <a:pPr marL="900000" indent="-457200" eaLnBrk="0" hangingPunct="0">
+          </a:p>
+          <a:p>
+            <a:pPr marL="1357200" lvl="1" indent="-342000" eaLnBrk="0" hangingPunct="0">
               <a:buFont typeface="Arial" charset="0"/>
               <a:buChar char="•"/>
             </a:pPr>
             <a:r>
-              <a:rPr lang="en-US" sz="2800" b="1" dirty="0" smtClean="0">
-                <a:latin typeface="+mn-lt"/>
-              </a:rPr>
-              <a:t>Tests’ output </a:t>
-            </a:r>
-            <a:r>
-              <a:rPr lang="en-US" sz="2800" b="1" dirty="0">
-                <a:latin typeface="+mn-lt"/>
-              </a:rPr>
-              <a:t>handlers</a:t>
-            </a:r>
-            <a:r>
-              <a:rPr lang="en-US" sz="2800" dirty="0">
-                <a:latin typeface="+mn-lt"/>
-              </a:rPr>
-              <a:t>: https://</a:t>
-            </a:r>
-            <a:r>
-              <a:rPr lang="en-US" sz="2800" dirty="0" err="1" smtClean="0">
-                <a:latin typeface="+mn-lt"/>
-              </a:rPr>
-              <a:t>gitlab.cern.ch</a:t>
-            </a:r>
-            <a:r>
-              <a:rPr lang="en-US" sz="2800" dirty="0" smtClean="0">
-                <a:latin typeface="+mn-lt"/>
-              </a:rPr>
-              <a:t>/</a:t>
-            </a:r>
-            <a:r>
-              <a:rPr lang="en-US" sz="2800" dirty="0" err="1" smtClean="0">
+              <a:rPr lang="en-US" dirty="0" smtClean="0">
+                <a:latin typeface="+mn-lt"/>
+              </a:rPr>
+              <a:t>https</a:t>
+            </a:r>
+            <a:r>
+              <a:rPr lang="en-US" dirty="0">
+                <a:latin typeface="+mn-lt"/>
+              </a:rPr>
+              <a:t>://</a:t>
+            </a:r>
+            <a:r>
+              <a:rPr lang="en-US" dirty="0" smtClean="0">
+                <a:latin typeface="+mn-lt"/>
+              </a:rPr>
+              <a:t>gitlab.cern.ch/</a:t>
+            </a:r>
+            <a:r>
+              <a:rPr lang="en-US" dirty="0" err="1" smtClean="0">
                 <a:latin typeface="+mn-lt"/>
               </a:rPr>
               <a:t>lhcb</a:t>
             </a:r>
             <a:r>
-              <a:rPr lang="en-US" sz="2800" dirty="0" smtClean="0">
-                <a:latin typeface="+mn-lt"/>
-              </a:rPr>
-              <a:t>-core/LHCbPR2HD</a:t>
-            </a:r>
-          </a:p>
-          <a:p>
-            <a:pPr marL="900000" indent="-457200" eaLnBrk="0" hangingPunct="0">
+              <a:rPr lang="en-US" dirty="0" smtClean="0">
+                <a:latin typeface="+mn-lt"/>
+              </a:rPr>
+              <a:t>-core/LHCbPR2FE</a:t>
+            </a:r>
+            <a:endParaRPr lang="en-US" b="1" dirty="0" smtClean="0">
+              <a:latin typeface="+mn-lt"/>
+            </a:endParaRPr>
+          </a:p>
+          <a:p>
+            <a:pPr marL="900000" indent="-342000" eaLnBrk="0" hangingPunct="0">
               <a:buFont typeface="Arial" charset="0"/>
               <a:buChar char="•"/>
             </a:pPr>
             <a:r>
-              <a:rPr lang="en-US" sz="2800" b="1" dirty="0" smtClean="0">
+              <a:rPr lang="en-US" b="1" dirty="0" smtClean="0">
+                <a:latin typeface="+mn-lt"/>
+              </a:rPr>
+              <a:t>API </a:t>
+            </a:r>
+            <a:r>
+              <a:rPr lang="en-US" b="1" dirty="0" smtClean="0">
+                <a:latin typeface="+mn-lt"/>
+              </a:rPr>
+              <a:t>service</a:t>
+            </a:r>
+            <a:r>
+              <a:rPr lang="en-US" dirty="0" smtClean="0">
+                <a:latin typeface="+mn-lt"/>
+              </a:rPr>
+              <a:t>: </a:t>
+            </a:r>
+            <a:endParaRPr lang="en-US" dirty="0" smtClean="0">
+              <a:latin typeface="+mn-lt"/>
+            </a:endParaRPr>
+          </a:p>
+          <a:p>
+            <a:pPr marL="1357200" lvl="1" indent="-342000" eaLnBrk="0" hangingPunct="0">
+              <a:buFont typeface="Arial" charset="0"/>
+              <a:buChar char="•"/>
+            </a:pPr>
+            <a:r>
+              <a:rPr lang="en-US" dirty="0" smtClean="0">
+                <a:latin typeface="+mn-lt"/>
+              </a:rPr>
+              <a:t>https</a:t>
+            </a:r>
+            <a:r>
+              <a:rPr lang="en-US" dirty="0">
+                <a:latin typeface="+mn-lt"/>
+              </a:rPr>
+              <a:t>://</a:t>
+            </a:r>
+            <a:r>
+              <a:rPr lang="en-US" dirty="0" smtClean="0">
+                <a:latin typeface="+mn-lt"/>
+              </a:rPr>
+              <a:t>gitlab.cern.ch/</a:t>
+            </a:r>
+            <a:r>
+              <a:rPr lang="en-US" dirty="0" err="1" smtClean="0">
+                <a:latin typeface="+mn-lt"/>
+              </a:rPr>
+              <a:t>lhcb</a:t>
+            </a:r>
+            <a:r>
+              <a:rPr lang="en-US" dirty="0" smtClean="0">
+                <a:latin typeface="+mn-lt"/>
+              </a:rPr>
+              <a:t>-core/LHCbPR2BE</a:t>
+            </a:r>
+          </a:p>
+          <a:p>
+            <a:pPr marL="900000" indent="-342000" eaLnBrk="0" hangingPunct="0">
+              <a:buFont typeface="Arial" charset="0"/>
+              <a:buChar char="•"/>
+            </a:pPr>
+            <a:r>
+              <a:rPr lang="en-US" b="1" dirty="0" smtClean="0">
+                <a:latin typeface="+mn-lt"/>
+              </a:rPr>
+              <a:t>ROOT </a:t>
+            </a:r>
+            <a:r>
+              <a:rPr lang="en-US" b="1" dirty="0">
+                <a:latin typeface="+mn-lt"/>
+              </a:rPr>
+              <a:t>HTTP service</a:t>
+            </a:r>
+            <a:r>
+              <a:rPr lang="en-US" dirty="0">
+                <a:latin typeface="+mn-lt"/>
+              </a:rPr>
+              <a:t>: </a:t>
+            </a:r>
+            <a:endParaRPr lang="en-US" dirty="0" smtClean="0">
+              <a:latin typeface="+mn-lt"/>
+            </a:endParaRPr>
+          </a:p>
+          <a:p>
+            <a:pPr marL="1357200" lvl="1" indent="-342000" eaLnBrk="0" hangingPunct="0">
+              <a:buFont typeface="Arial" charset="0"/>
+              <a:buChar char="•"/>
+            </a:pPr>
+            <a:r>
+              <a:rPr lang="en-US" dirty="0" smtClean="0">
+                <a:latin typeface="+mn-lt"/>
+              </a:rPr>
+              <a:t>https</a:t>
+            </a:r>
+            <a:r>
+              <a:rPr lang="en-US" dirty="0">
+                <a:latin typeface="+mn-lt"/>
+              </a:rPr>
+              <a:t>://</a:t>
+            </a:r>
+            <a:r>
+              <a:rPr lang="en-US" dirty="0" err="1">
+                <a:latin typeface="+mn-lt"/>
+              </a:rPr>
+              <a:t>gitlab.cern.ch</a:t>
+            </a:r>
+            <a:r>
+              <a:rPr lang="en-US" dirty="0">
+                <a:latin typeface="+mn-lt"/>
+              </a:rPr>
+              <a:t>/</a:t>
+            </a:r>
+            <a:r>
+              <a:rPr lang="en-US" dirty="0" err="1">
+                <a:latin typeface="+mn-lt"/>
+              </a:rPr>
+              <a:t>lhcb</a:t>
+            </a:r>
+            <a:r>
+              <a:rPr lang="en-US" dirty="0">
+                <a:latin typeface="+mn-lt"/>
+              </a:rPr>
+              <a:t>-core/LHCbPR2ROOT</a:t>
+            </a:r>
+            <a:endParaRPr lang="en-US" dirty="0" smtClean="0">
+              <a:latin typeface="+mn-lt"/>
+            </a:endParaRPr>
+          </a:p>
+          <a:p>
+            <a:pPr marL="900000" indent="-342000" eaLnBrk="0" hangingPunct="0">
+              <a:buFont typeface="Arial" charset="0"/>
+              <a:buChar char="•"/>
+            </a:pPr>
+            <a:r>
+              <a:rPr lang="en-US" b="1" dirty="0" smtClean="0">
+                <a:latin typeface="+mn-lt"/>
+              </a:rPr>
+              <a:t>Tests</a:t>
+            </a:r>
+            <a:r>
+              <a:rPr lang="en-US" b="1" dirty="0" smtClean="0">
+                <a:latin typeface="+mn-lt"/>
+              </a:rPr>
+              <a:t>’ output </a:t>
+            </a:r>
+            <a:r>
+              <a:rPr lang="en-US" b="1" dirty="0">
+                <a:latin typeface="+mn-lt"/>
+              </a:rPr>
+              <a:t>handlers</a:t>
+            </a:r>
+            <a:r>
+              <a:rPr lang="en-US" dirty="0">
+                <a:latin typeface="+mn-lt"/>
+              </a:rPr>
+              <a:t>: </a:t>
+            </a:r>
+            <a:endParaRPr lang="en-US" dirty="0" smtClean="0">
+              <a:latin typeface="+mn-lt"/>
+            </a:endParaRPr>
+          </a:p>
+          <a:p>
+            <a:pPr marL="1357200" lvl="1" indent="-342000" eaLnBrk="0" hangingPunct="0">
+              <a:buFont typeface="Arial" charset="0"/>
+              <a:buChar char="•"/>
+            </a:pPr>
+            <a:r>
+              <a:rPr lang="en-US" dirty="0" smtClean="0">
+                <a:latin typeface="+mn-lt"/>
+              </a:rPr>
+              <a:t>https</a:t>
+            </a:r>
+            <a:r>
+              <a:rPr lang="en-US" dirty="0">
+                <a:latin typeface="+mn-lt"/>
+              </a:rPr>
+              <a:t>://</a:t>
+            </a:r>
+            <a:r>
+              <a:rPr lang="en-US" dirty="0" err="1" smtClean="0">
+                <a:latin typeface="+mn-lt"/>
+              </a:rPr>
+              <a:t>gitlab.cern.ch</a:t>
+            </a:r>
+            <a:r>
+              <a:rPr lang="en-US" dirty="0" smtClean="0">
+                <a:latin typeface="+mn-lt"/>
+              </a:rPr>
+              <a:t>/</a:t>
+            </a:r>
+            <a:r>
+              <a:rPr lang="en-US" dirty="0" err="1" smtClean="0">
+                <a:latin typeface="+mn-lt"/>
+              </a:rPr>
+              <a:t>lhcb</a:t>
+            </a:r>
+            <a:r>
+              <a:rPr lang="en-US" dirty="0" smtClean="0">
+                <a:latin typeface="+mn-lt"/>
+              </a:rPr>
+              <a:t>-core/LHCbPR2HD</a:t>
+            </a:r>
+          </a:p>
+          <a:p>
+            <a:pPr marL="900000" indent="-342000" eaLnBrk="0" hangingPunct="0">
+              <a:buFont typeface="Arial" charset="0"/>
+              <a:buChar char="•"/>
+            </a:pPr>
+            <a:r>
+              <a:rPr lang="en-US" b="1" dirty="0" smtClean="0">
                 <a:latin typeface="+mn-lt"/>
               </a:rPr>
               <a:t>Proxy server and </a:t>
             </a:r>
             <a:r>
-              <a:rPr lang="en-US" sz="2800" b="1" dirty="0">
+              <a:rPr lang="en-US" b="1" dirty="0">
                 <a:latin typeface="+mn-lt"/>
               </a:rPr>
               <a:t>project builder</a:t>
             </a:r>
             <a:r>
-              <a:rPr lang="en-US" sz="2800" dirty="0">
-                <a:latin typeface="+mn-lt"/>
-              </a:rPr>
-              <a:t>: https://</a:t>
-            </a:r>
-            <a:r>
-              <a:rPr lang="en-US" sz="2800" dirty="0" err="1">
+              <a:rPr lang="en-US" dirty="0" smtClean="0">
+                <a:latin typeface="+mn-lt"/>
+              </a:rPr>
+              <a:t>:</a:t>
+            </a:r>
+          </a:p>
+          <a:p>
+            <a:pPr marL="1357200" lvl="1" indent="-342000" eaLnBrk="0" hangingPunct="0">
+              <a:buFont typeface="Arial" charset="0"/>
+              <a:buChar char="•"/>
+            </a:pPr>
+            <a:r>
+              <a:rPr lang="en-US" dirty="0" smtClean="0">
+                <a:latin typeface="+mn-lt"/>
+              </a:rPr>
+              <a:t> </a:t>
+            </a:r>
+            <a:r>
+              <a:rPr lang="en-US" dirty="0">
+                <a:latin typeface="+mn-lt"/>
+              </a:rPr>
+              <a:t>https://</a:t>
+            </a:r>
+            <a:r>
+              <a:rPr lang="en-US" dirty="0" err="1">
                 <a:latin typeface="+mn-lt"/>
               </a:rPr>
               <a:t>gitlab.cern.ch</a:t>
             </a:r>
             <a:r>
-              <a:rPr lang="en-US" sz="2800" dirty="0">
+              <a:rPr lang="en-US" dirty="0">
                 <a:latin typeface="+mn-lt"/>
               </a:rPr>
               <a:t>/</a:t>
             </a:r>
             <a:r>
-              <a:rPr lang="en-US" sz="2800" dirty="0" err="1">
+              <a:rPr lang="en-US" dirty="0" err="1">
                 <a:latin typeface="+mn-lt"/>
               </a:rPr>
               <a:t>amazurov</a:t>
             </a:r>
             <a:r>
-              <a:rPr lang="en-US" sz="2800" dirty="0">
+              <a:rPr lang="en-US" dirty="0">
                 <a:latin typeface="+mn-lt"/>
               </a:rPr>
               <a:t>/LHCbPR2</a:t>
             </a:r>
-            <a:endParaRPr lang="en-US" sz="2800" dirty="0" smtClean="0">
+            <a:endParaRPr lang="en-US" dirty="0" smtClean="0">
               <a:latin typeface="+mn-lt"/>
             </a:endParaRPr>
           </a:p>

</xml_diff>